<commit_message>
final version before revision
</commit_message>
<xml_diff>
--- a/figures/Dibujos.pptx
+++ b/figures/Dibujos.pptx
@@ -199,7 +199,7 @@
           <a:p>
             <a:fld id="{79377C3E-6FF3-4B38-961D-5EDB814D0057}" type="datetimeFigureOut">
               <a:rPr lang="es-ES"/>
-              <a:t>15/11/2015</a:t>
+              <a:t>19/11/2015</a:t>
             </a:fld>
             <a:endParaRPr lang="es-ES"/>
           </a:p>
@@ -765,7 +765,7 @@
           <a:p>
             <a:fld id="{C764DE79-268F-4C1A-8933-263129D2AF90}" type="datetimeFigureOut">
               <a:rPr lang="en-US" smtClean="0"/>
-              <a:t>15/11/2015</a:t>
+              <a:t>19/11/2015</a:t>
             </a:fld>
             <a:endParaRPr lang="en-US"/>
           </a:p>
@@ -935,7 +935,7 @@
           <a:p>
             <a:fld id="{C764DE79-268F-4C1A-8933-263129D2AF90}" type="datetimeFigureOut">
               <a:rPr lang="en-US" smtClean="0"/>
-              <a:t>15/11/2015</a:t>
+              <a:t>19/11/2015</a:t>
             </a:fld>
             <a:endParaRPr lang="en-US"/>
           </a:p>
@@ -1115,7 +1115,7 @@
           <a:p>
             <a:fld id="{C764DE79-268F-4C1A-8933-263129D2AF90}" type="datetimeFigureOut">
               <a:rPr lang="en-US" smtClean="0"/>
-              <a:t>15/11/2015</a:t>
+              <a:t>19/11/2015</a:t>
             </a:fld>
             <a:endParaRPr lang="en-US"/>
           </a:p>
@@ -1285,7 +1285,7 @@
           <a:p>
             <a:fld id="{C764DE79-268F-4C1A-8933-263129D2AF90}" type="datetimeFigureOut">
               <a:rPr lang="en-US" smtClean="0"/>
-              <a:t>15/11/2015</a:t>
+              <a:t>19/11/2015</a:t>
             </a:fld>
             <a:endParaRPr lang="en-US"/>
           </a:p>
@@ -1529,7 +1529,7 @@
           <a:p>
             <a:fld id="{C764DE79-268F-4C1A-8933-263129D2AF90}" type="datetimeFigureOut">
               <a:rPr lang="en-US" smtClean="0"/>
-              <a:t>15/11/2015</a:t>
+              <a:t>19/11/2015</a:t>
             </a:fld>
             <a:endParaRPr lang="en-US"/>
           </a:p>
@@ -1761,7 +1761,7 @@
           <a:p>
             <a:fld id="{C764DE79-268F-4C1A-8933-263129D2AF90}" type="datetimeFigureOut">
               <a:rPr lang="en-US" smtClean="0"/>
-              <a:t>15/11/2015</a:t>
+              <a:t>19/11/2015</a:t>
             </a:fld>
             <a:endParaRPr lang="en-US"/>
           </a:p>
@@ -2128,7 +2128,7 @@
           <a:p>
             <a:fld id="{C764DE79-268F-4C1A-8933-263129D2AF90}" type="datetimeFigureOut">
               <a:rPr lang="en-US" smtClean="0"/>
-              <a:t>15/11/2015</a:t>
+              <a:t>19/11/2015</a:t>
             </a:fld>
             <a:endParaRPr lang="en-US"/>
           </a:p>
@@ -2246,7 +2246,7 @@
           <a:p>
             <a:fld id="{C764DE79-268F-4C1A-8933-263129D2AF90}" type="datetimeFigureOut">
               <a:rPr lang="en-US" smtClean="0"/>
-              <a:t>15/11/2015</a:t>
+              <a:t>19/11/2015</a:t>
             </a:fld>
             <a:endParaRPr lang="en-US"/>
           </a:p>
@@ -2341,7 +2341,7 @@
           <a:p>
             <a:fld id="{C764DE79-268F-4C1A-8933-263129D2AF90}" type="datetimeFigureOut">
               <a:rPr lang="en-US" smtClean="0"/>
-              <a:t>15/11/2015</a:t>
+              <a:t>19/11/2015</a:t>
             </a:fld>
             <a:endParaRPr lang="en-US"/>
           </a:p>
@@ -2618,7 +2618,7 @@
           <a:p>
             <a:fld id="{C764DE79-268F-4C1A-8933-263129D2AF90}" type="datetimeFigureOut">
               <a:rPr lang="en-US" smtClean="0"/>
-              <a:t>15/11/2015</a:t>
+              <a:t>19/11/2015</a:t>
             </a:fld>
             <a:endParaRPr lang="en-US"/>
           </a:p>
@@ -2875,7 +2875,7 @@
           <a:p>
             <a:fld id="{C764DE79-268F-4C1A-8933-263129D2AF90}" type="datetimeFigureOut">
               <a:rPr lang="en-US" smtClean="0"/>
-              <a:t>15/11/2015</a:t>
+              <a:t>19/11/2015</a:t>
             </a:fld>
             <a:endParaRPr lang="en-US"/>
           </a:p>
@@ -3088,7 +3088,7 @@
           <a:p>
             <a:fld id="{C764DE79-268F-4C1A-8933-263129D2AF90}" type="datetimeFigureOut">
               <a:rPr lang="en-US" smtClean="0"/>
-              <a:t>15/11/2015</a:t>
+              <a:t>19/11/2015</a:t>
             </a:fld>
             <a:endParaRPr lang="en-US"/>
           </a:p>
@@ -3789,9 +3789,9 @@
         <p:grpSpPr>
           <a:xfrm>
             <a:off x="511834" y="2335087"/>
-            <a:ext cx="4350651" cy="2837906"/>
+            <a:ext cx="4354487" cy="2837906"/>
             <a:chOff x="533400" y="3591757"/>
-            <a:chExt cx="4350651" cy="2837906"/>
+            <a:chExt cx="4354487" cy="2837906"/>
           </a:xfrm>
         </p:grpSpPr>
         <p:sp>
@@ -4104,10 +4104,10 @@
           </p:nvGrpSpPr>
           <p:grpSpPr>
             <a:xfrm>
-              <a:off x="4441228" y="5072351"/>
-              <a:ext cx="442823" cy="408419"/>
-              <a:chOff x="6755778" y="3934981"/>
-              <a:chExt cx="442823" cy="408419"/>
+              <a:off x="4450234" y="5150788"/>
+              <a:ext cx="437653" cy="398051"/>
+              <a:chOff x="6764784" y="4013418"/>
+              <a:chExt cx="437653" cy="398051"/>
             </a:xfrm>
           </p:grpSpPr>
           <p:sp>
@@ -4118,7 +4118,7 @@
             </p:nvSpPr>
             <p:spPr>
               <a:xfrm>
-                <a:off x="6755778" y="3934981"/>
+                <a:off x="6764784" y="4013418"/>
                 <a:ext cx="421257" cy="307777"/>
               </a:xfrm>
               <a:prstGeom prst="rect">
@@ -4133,7 +4133,7 @@
               <a:p>
                 <a:pPr algn="ctr"/>
                 <a:r>
-                  <a:rPr lang="es-ES" sz="1400">
+                  <a:rPr lang="es-ES" sz="1400" dirty="0">
                     <a:solidFill>
                       <a:srgbClr val="595959"/>
                     </a:solidFill>
@@ -4142,13 +4142,6 @@
                   </a:rPr>
                   <a:t>^</a:t>
                 </a:r>
-                <a:endParaRPr lang="es-ES" sz="1400" dirty="0">
-                  <a:solidFill>
-                    <a:srgbClr val="595959"/>
-                  </a:solidFill>
-                  <a:latin typeface="Arial"/>
-                  <a:cs typeface="Arial"/>
-                </a:endParaRPr>
               </a:p>
             </p:txBody>
           </p:sp>
@@ -4160,7 +4153,7 @@
             </p:nvSpPr>
             <p:spPr>
               <a:xfrm>
-                <a:off x="6777344" y="4035623"/>
+                <a:off x="6781180" y="4103692"/>
                 <a:ext cx="421257" cy="307777"/>
               </a:xfrm>
               <a:prstGeom prst="rect">
@@ -4332,261 +4325,596 @@
           </p:txBody>
         </p:sp>
       </p:grpSp>
+      <p:cxnSp>
+        <p:nvCxnSpPr>
+          <p:cNvPr id="31" name="Conector recto de flecha 2"/>
+          <p:cNvCxnSpPr/>
+          <p:nvPr/>
+        </p:nvCxnSpPr>
+        <p:spPr>
+          <a:xfrm rot="2107705" flipH="1">
+            <a:off x="7741583" y="1930406"/>
+            <a:ext cx="629504" cy="686584"/>
+          </a:xfrm>
+          <a:prstGeom prst="straightConnector1">
+            <a:avLst/>
+          </a:prstGeom>
+          <a:ln>
+            <a:solidFill>
+              <a:schemeClr val="tx2">
+                <a:lumMod val="75000"/>
+              </a:schemeClr>
+            </a:solidFill>
+            <a:headEnd type="none"/>
+            <a:tailEnd type="none"/>
+          </a:ln>
+        </p:spPr>
+        <p:style>
+          <a:lnRef idx="2">
+            <a:schemeClr val="accent1">
+              <a:shade val="50000"/>
+            </a:schemeClr>
+          </a:lnRef>
+          <a:fillRef idx="1">
+            <a:schemeClr val="accent1"/>
+          </a:fillRef>
+          <a:effectRef idx="0">
+            <a:schemeClr val="accent1"/>
+          </a:effectRef>
+          <a:fontRef idx="minor">
+            <a:schemeClr val="lt1"/>
+          </a:fontRef>
+        </p:style>
+      </p:cxnSp>
+      <p:cxnSp>
+        <p:nvCxnSpPr>
+          <p:cNvPr id="32" name="Conector recto de flecha 3"/>
+          <p:cNvCxnSpPr/>
+          <p:nvPr/>
+        </p:nvCxnSpPr>
+        <p:spPr>
+          <a:xfrm rot="2107705" flipH="1">
+            <a:off x="8011261" y="2005797"/>
+            <a:ext cx="292649" cy="892994"/>
+          </a:xfrm>
+          <a:prstGeom prst="straightConnector1">
+            <a:avLst/>
+          </a:prstGeom>
+          <a:ln>
+            <a:solidFill>
+              <a:schemeClr val="tx2">
+                <a:lumMod val="75000"/>
+              </a:schemeClr>
+            </a:solidFill>
+            <a:headEnd type="none"/>
+            <a:tailEnd type="none"/>
+          </a:ln>
+        </p:spPr>
+        <p:style>
+          <a:lnRef idx="2">
+            <a:schemeClr val="accent1">
+              <a:shade val="50000"/>
+            </a:schemeClr>
+          </a:lnRef>
+          <a:fillRef idx="1">
+            <a:schemeClr val="accent1"/>
+          </a:fillRef>
+          <a:effectRef idx="0">
+            <a:schemeClr val="accent1"/>
+          </a:effectRef>
+          <a:fontRef idx="minor">
+            <a:schemeClr val="lt1"/>
+          </a:fontRef>
+        </p:style>
+      </p:cxnSp>
+      <p:cxnSp>
+        <p:nvCxnSpPr>
+          <p:cNvPr id="33" name="Conector curvado 5"/>
+          <p:cNvCxnSpPr/>
+          <p:nvPr/>
+        </p:nvCxnSpPr>
+        <p:spPr>
+          <a:xfrm rot="2107705">
+            <a:off x="7775543" y="2123303"/>
+            <a:ext cx="444233" cy="284632"/>
+          </a:xfrm>
+          <a:prstGeom prst="curvedConnector3">
+            <a:avLst/>
+          </a:prstGeom>
+          <a:ln>
+            <a:solidFill>
+              <a:schemeClr val="bg2">
+                <a:lumMod val="50000"/>
+              </a:schemeClr>
+            </a:solidFill>
+            <a:headEnd type="none"/>
+            <a:tailEnd type="none"/>
+          </a:ln>
+        </p:spPr>
+        <p:style>
+          <a:lnRef idx="2">
+            <a:schemeClr val="accent1">
+              <a:shade val="50000"/>
+            </a:schemeClr>
+          </a:lnRef>
+          <a:fillRef idx="1">
+            <a:schemeClr val="accent1"/>
+          </a:fillRef>
+          <a:effectRef idx="0">
+            <a:schemeClr val="accent1"/>
+          </a:effectRef>
+          <a:fontRef idx="minor">
+            <a:schemeClr val="lt1"/>
+          </a:fontRef>
+        </p:style>
+      </p:cxnSp>
+      <p:sp>
+        <p:nvSpPr>
+          <p:cNvPr id="34" name="Triángulo isósceles 6"/>
+          <p:cNvSpPr/>
+          <p:nvPr/>
+        </p:nvSpPr>
+        <p:spPr>
+          <a:xfrm rot="6787705">
+            <a:off x="7595769" y="1839335"/>
+            <a:ext cx="771870" cy="532955"/>
+          </a:xfrm>
+          <a:prstGeom prst="triangle">
+            <a:avLst/>
+          </a:prstGeom>
+          <a:solidFill>
+            <a:schemeClr val="bg1"/>
+          </a:solidFill>
+          <a:ln>
+            <a:solidFill>
+              <a:schemeClr val="bg1"/>
+            </a:solidFill>
+          </a:ln>
+        </p:spPr>
+        <p:style>
+          <a:lnRef idx="2">
+            <a:schemeClr val="accent1">
+              <a:shade val="50000"/>
+            </a:schemeClr>
+          </a:lnRef>
+          <a:fillRef idx="1">
+            <a:schemeClr val="accent1"/>
+          </a:fillRef>
+          <a:effectRef idx="0">
+            <a:schemeClr val="accent1"/>
+          </a:effectRef>
+          <a:fontRef idx="minor">
+            <a:schemeClr val="lt1"/>
+          </a:fontRef>
+        </p:style>
+        <p:txBody>
+          <a:bodyPr rtlCol="0" anchor="ctr"/>
+          <a:lstStyle/>
+          <a:p>
+            <a:pPr algn="ctr"/>
+            <a:endParaRPr lang="es-ES"/>
+          </a:p>
+        </p:txBody>
+      </p:sp>
+      <p:sp>
+        <p:nvSpPr>
+          <p:cNvPr id="35" name="Elipse 7"/>
+          <p:cNvSpPr/>
+          <p:nvPr/>
+        </p:nvSpPr>
+        <p:spPr>
+          <a:xfrm rot="2107705">
+            <a:off x="8060378" y="2328755"/>
+            <a:ext cx="99567" cy="105649"/>
+          </a:xfrm>
+          <a:prstGeom prst="ellipse">
+            <a:avLst/>
+          </a:prstGeom>
+          <a:solidFill>
+            <a:schemeClr val="bg2">
+              <a:lumMod val="25000"/>
+            </a:schemeClr>
+          </a:solidFill>
+          <a:ln>
+            <a:solidFill>
+              <a:schemeClr val="tx1"/>
+            </a:solidFill>
+          </a:ln>
+        </p:spPr>
+        <p:style>
+          <a:lnRef idx="2">
+            <a:schemeClr val="accent1">
+              <a:shade val="50000"/>
+            </a:schemeClr>
+          </a:lnRef>
+          <a:fillRef idx="1">
+            <a:schemeClr val="accent1"/>
+          </a:fillRef>
+          <a:effectRef idx="0">
+            <a:schemeClr val="accent1"/>
+          </a:effectRef>
+          <a:fontRef idx="minor">
+            <a:schemeClr val="lt1"/>
+          </a:fontRef>
+        </p:style>
+        <p:txBody>
+          <a:bodyPr rtlCol="0" anchor="ctr"/>
+          <a:lstStyle/>
+          <a:p>
+            <a:pPr algn="ctr"/>
+            <a:endParaRPr lang="es-ES"/>
+          </a:p>
+        </p:txBody>
+      </p:sp>
+      <p:cxnSp>
+        <p:nvCxnSpPr>
+          <p:cNvPr id="36" name="Conector recto de flecha 8"/>
+          <p:cNvCxnSpPr/>
+          <p:nvPr/>
+        </p:nvCxnSpPr>
+        <p:spPr>
+          <a:xfrm rot="2107705" flipH="1">
+            <a:off x="7482898" y="2753863"/>
+            <a:ext cx="92637" cy="273767"/>
+          </a:xfrm>
+          <a:prstGeom prst="straightConnector1">
+            <a:avLst/>
+          </a:prstGeom>
+          <a:ln>
+            <a:solidFill>
+              <a:schemeClr val="tx1">
+                <a:lumMod val="95000"/>
+                <a:lumOff val="5000"/>
+              </a:schemeClr>
+            </a:solidFill>
+            <a:headEnd type="none"/>
+            <a:tailEnd type="none"/>
+          </a:ln>
+        </p:spPr>
+        <p:style>
+          <a:lnRef idx="1">
+            <a:schemeClr val="accent5"/>
+          </a:lnRef>
+          <a:fillRef idx="0">
+            <a:schemeClr val="accent5"/>
+          </a:fillRef>
+          <a:effectRef idx="0">
+            <a:schemeClr val="accent5"/>
+          </a:effectRef>
+          <a:fontRef idx="minor">
+            <a:schemeClr val="tx1"/>
+          </a:fontRef>
+        </p:style>
+      </p:cxnSp>
+      <p:cxnSp>
+        <p:nvCxnSpPr>
+          <p:cNvPr id="37" name="Conector recto de flecha 9"/>
+          <p:cNvCxnSpPr/>
+          <p:nvPr/>
+        </p:nvCxnSpPr>
+        <p:spPr>
+          <a:xfrm rot="2107705" flipH="1">
+            <a:off x="7154200" y="3003803"/>
+            <a:ext cx="92637" cy="273767"/>
+          </a:xfrm>
+          <a:prstGeom prst="straightConnector1">
+            <a:avLst/>
+          </a:prstGeom>
+          <a:ln>
+            <a:solidFill>
+              <a:schemeClr val="tx1">
+                <a:lumMod val="95000"/>
+                <a:lumOff val="5000"/>
+              </a:schemeClr>
+            </a:solidFill>
+            <a:headEnd type="none"/>
+            <a:tailEnd type="none"/>
+          </a:ln>
+        </p:spPr>
+        <p:style>
+          <a:lnRef idx="1">
+            <a:schemeClr val="accent5"/>
+          </a:lnRef>
+          <a:fillRef idx="0">
+            <a:schemeClr val="accent5"/>
+          </a:fillRef>
+          <a:effectRef idx="0">
+            <a:schemeClr val="accent5"/>
+          </a:effectRef>
+          <a:fontRef idx="minor">
+            <a:schemeClr val="tx1"/>
+          </a:fontRef>
+        </p:style>
+      </p:cxnSp>
+      <p:cxnSp>
+        <p:nvCxnSpPr>
+          <p:cNvPr id="38" name="Conector recto de flecha 10"/>
+          <p:cNvCxnSpPr/>
+          <p:nvPr/>
+        </p:nvCxnSpPr>
+        <p:spPr>
+          <a:xfrm rot="2107705" flipH="1">
+            <a:off x="6817238" y="3244919"/>
+            <a:ext cx="92637" cy="273767"/>
+          </a:xfrm>
+          <a:prstGeom prst="straightConnector1">
+            <a:avLst/>
+          </a:prstGeom>
+          <a:ln>
+            <a:solidFill>
+              <a:schemeClr val="tx1">
+                <a:lumMod val="95000"/>
+                <a:lumOff val="5000"/>
+              </a:schemeClr>
+            </a:solidFill>
+            <a:headEnd type="none"/>
+            <a:tailEnd type="none"/>
+          </a:ln>
+        </p:spPr>
+        <p:style>
+          <a:lnRef idx="1">
+            <a:schemeClr val="accent5"/>
+          </a:lnRef>
+          <a:fillRef idx="0">
+            <a:schemeClr val="accent5"/>
+          </a:fillRef>
+          <a:effectRef idx="0">
+            <a:schemeClr val="accent5"/>
+          </a:effectRef>
+          <a:fontRef idx="minor">
+            <a:schemeClr val="tx1"/>
+          </a:fontRef>
+        </p:style>
+      </p:cxnSp>
+      <p:cxnSp>
+        <p:nvCxnSpPr>
+          <p:cNvPr id="39" name="Conector recto de flecha 11"/>
+          <p:cNvCxnSpPr/>
+          <p:nvPr/>
+        </p:nvCxnSpPr>
+        <p:spPr>
+          <a:xfrm rot="2107705" flipH="1">
+            <a:off x="7216370" y="2350208"/>
+            <a:ext cx="176851" cy="186858"/>
+          </a:xfrm>
+          <a:prstGeom prst="straightConnector1">
+            <a:avLst/>
+          </a:prstGeom>
+          <a:ln>
+            <a:solidFill>
+              <a:schemeClr val="tx1">
+                <a:lumMod val="95000"/>
+                <a:lumOff val="5000"/>
+              </a:schemeClr>
+            </a:solidFill>
+            <a:headEnd type="none"/>
+            <a:tailEnd type="none"/>
+          </a:ln>
+        </p:spPr>
+        <p:style>
+          <a:lnRef idx="1">
+            <a:schemeClr val="accent5"/>
+          </a:lnRef>
+          <a:fillRef idx="0">
+            <a:schemeClr val="accent5"/>
+          </a:fillRef>
+          <a:effectRef idx="0">
+            <a:schemeClr val="accent5"/>
+          </a:effectRef>
+          <a:fontRef idx="minor">
+            <a:schemeClr val="tx1"/>
+          </a:fontRef>
+        </p:style>
+      </p:cxnSp>
+      <p:cxnSp>
+        <p:nvCxnSpPr>
+          <p:cNvPr id="40" name="Conector recto de flecha 12"/>
+          <p:cNvCxnSpPr/>
+          <p:nvPr/>
+        </p:nvCxnSpPr>
+        <p:spPr>
+          <a:xfrm rot="2107705" flipH="1">
+            <a:off x="6823744" y="2432613"/>
+            <a:ext cx="176851" cy="186858"/>
+          </a:xfrm>
+          <a:prstGeom prst="straightConnector1">
+            <a:avLst/>
+          </a:prstGeom>
+          <a:ln>
+            <a:solidFill>
+              <a:schemeClr val="tx1">
+                <a:lumMod val="95000"/>
+                <a:lumOff val="5000"/>
+              </a:schemeClr>
+            </a:solidFill>
+            <a:headEnd type="none"/>
+            <a:tailEnd type="none"/>
+          </a:ln>
+        </p:spPr>
+        <p:style>
+          <a:lnRef idx="1">
+            <a:schemeClr val="accent5"/>
+          </a:lnRef>
+          <a:fillRef idx="0">
+            <a:schemeClr val="accent5"/>
+          </a:fillRef>
+          <a:effectRef idx="0">
+            <a:schemeClr val="accent5"/>
+          </a:effectRef>
+          <a:fontRef idx="minor">
+            <a:schemeClr val="tx1"/>
+          </a:fontRef>
+        </p:style>
+      </p:cxnSp>
+      <p:cxnSp>
+        <p:nvCxnSpPr>
+          <p:cNvPr id="41" name="Conector recto de flecha 13"/>
+          <p:cNvCxnSpPr/>
+          <p:nvPr/>
+        </p:nvCxnSpPr>
+        <p:spPr>
+          <a:xfrm rot="2107705" flipH="1">
+            <a:off x="6416255" y="2517847"/>
+            <a:ext cx="176851" cy="186858"/>
+          </a:xfrm>
+          <a:prstGeom prst="straightConnector1">
+            <a:avLst/>
+          </a:prstGeom>
+          <a:ln>
+            <a:solidFill>
+              <a:schemeClr val="tx1">
+                <a:lumMod val="95000"/>
+                <a:lumOff val="5000"/>
+              </a:schemeClr>
+            </a:solidFill>
+            <a:headEnd type="none"/>
+            <a:tailEnd type="none"/>
+          </a:ln>
+        </p:spPr>
+        <p:style>
+          <a:lnRef idx="1">
+            <a:schemeClr val="accent5"/>
+          </a:lnRef>
+          <a:fillRef idx="0">
+            <a:schemeClr val="accent5"/>
+          </a:fillRef>
+          <a:effectRef idx="0">
+            <a:schemeClr val="accent5"/>
+          </a:effectRef>
+          <a:fontRef idx="minor">
+            <a:schemeClr val="tx1"/>
+          </a:fontRef>
+        </p:style>
+      </p:cxnSp>
+      <p:sp>
+        <p:nvSpPr>
+          <p:cNvPr id="42" name="TextBox 15"/>
+          <p:cNvSpPr txBox="1"/>
+          <p:nvPr/>
+        </p:nvSpPr>
+        <p:spPr>
+          <a:xfrm>
+            <a:off x="4220854" y="2804255"/>
+            <a:ext cx="656390" cy="307777"/>
+          </a:xfrm>
+          <a:prstGeom prst="rect">
+            <a:avLst/>
+          </a:prstGeom>
+          <a:noFill/>
+        </p:spPr>
+        <p:txBody>
+          <a:bodyPr wrap="square" rtlCol="0" anchor="t">
+            <a:spAutoFit/>
+          </a:bodyPr>
+          <a:lstStyle/>
+          <a:p>
+            <a:r>
+              <a:rPr lang="el-GR" sz="1400" dirty="0">
+                <a:solidFill>
+                  <a:srgbClr val="002060"/>
+                </a:solidFill>
+                <a:latin typeface="Arial" charset="0"/>
+              </a:rPr>
+              <a:t>θ</a:t>
+            </a:r>
+            <a:r>
+              <a:rPr lang="el-GR" sz="700" dirty="0">
+                <a:solidFill>
+                  <a:srgbClr val="002060"/>
+                </a:solidFill>
+                <a:latin typeface="Arial" charset="0"/>
+              </a:rPr>
+              <a:t>min</a:t>
+            </a:r>
+            <a:endParaRPr lang="es-ES" sz="700" dirty="0">
+              <a:solidFill>
+                <a:srgbClr val="002060"/>
+              </a:solidFill>
+              <a:latin typeface="Arial"/>
+            </a:endParaRPr>
+          </a:p>
+        </p:txBody>
+      </p:sp>
+      <p:sp>
+        <p:nvSpPr>
+          <p:cNvPr id="43" name="TextBox 42"/>
+          <p:cNvSpPr txBox="1"/>
+          <p:nvPr/>
+        </p:nvSpPr>
+        <p:spPr>
+          <a:xfrm>
+            <a:off x="4768929" y="3692626"/>
+            <a:ext cx="723983" cy="307777"/>
+          </a:xfrm>
+          <a:prstGeom prst="rect">
+            <a:avLst/>
+          </a:prstGeom>
+          <a:noFill/>
+        </p:spPr>
+        <p:txBody>
+          <a:bodyPr wrap="square" rtlCol="0" anchor="t">
+            <a:spAutoFit/>
+          </a:bodyPr>
+          <a:lstStyle/>
+          <a:p>
+            <a:r>
+              <a:rPr lang="el-GR" sz="1400" dirty="0">
+                <a:solidFill>
+                  <a:srgbClr val="002060"/>
+                </a:solidFill>
+                <a:latin typeface="Arial" charset="0"/>
+              </a:rPr>
+              <a:t>θ</a:t>
+            </a:r>
+            <a:r>
+              <a:rPr lang="el-GR" sz="700" dirty="0">
+                <a:solidFill>
+                  <a:srgbClr val="002060"/>
+                </a:solidFill>
+                <a:latin typeface="Arial" charset="0"/>
+              </a:rPr>
+              <a:t>max</a:t>
+            </a:r>
+            <a:endParaRPr lang="es-ES" sz="700" dirty="0">
+              <a:solidFill>
+                <a:srgbClr val="002060"/>
+              </a:solidFill>
+              <a:latin typeface="Arial"/>
+            </a:endParaRPr>
+          </a:p>
+        </p:txBody>
+      </p:sp>
       <p:grpSp>
         <p:nvGrpSpPr>
-          <p:cNvPr id="30" name="Group 29"/>
+          <p:cNvPr id="4" name="Group 3"/>
           <p:cNvGrpSpPr/>
           <p:nvPr/>
         </p:nvGrpSpPr>
         <p:grpSpPr>
-          <a:xfrm rot="2107705">
-            <a:off x="6459405" y="1442209"/>
-            <a:ext cx="1800117" cy="2209800"/>
-            <a:chOff x="2493048" y="2550461"/>
-            <a:chExt cx="1229282" cy="1462261"/>
+          <a:xfrm rot="21267820">
+            <a:off x="3317751" y="3117552"/>
+            <a:ext cx="1072368" cy="1011276"/>
+            <a:chOff x="5448365" y="4947723"/>
+            <a:chExt cx="1072368" cy="1011276"/>
           </a:xfrm>
         </p:grpSpPr>
         <p:cxnSp>
           <p:nvCxnSpPr>
-            <p:cNvPr id="31" name="Conector recto de flecha 2"/>
+            <p:cNvPr id="48" name="Conector recto de flecha 8"/>
             <p:cNvCxnSpPr/>
             <p:nvPr/>
           </p:nvCxnSpPr>
           <p:spPr>
-            <a:xfrm flipH="1">
-              <a:off x="3174524" y="2641121"/>
-              <a:ext cx="429882" cy="454324"/>
+            <a:xfrm rot="2107705" flipH="1">
+              <a:off x="6114025" y="5194176"/>
+              <a:ext cx="92637" cy="273767"/>
             </a:xfrm>
             <a:prstGeom prst="straightConnector1">
               <a:avLst/>
             </a:prstGeom>
             <a:ln>
               <a:solidFill>
-                <a:schemeClr val="tx2">
-                  <a:lumMod val="75000"/>
-                </a:schemeClr>
-              </a:solidFill>
-              <a:headEnd type="none"/>
-              <a:tailEnd type="none"/>
-            </a:ln>
-          </p:spPr>
-          <p:style>
-            <a:lnRef idx="2">
-              <a:schemeClr val="accent1">
-                <a:shade val="50000"/>
-              </a:schemeClr>
-            </a:lnRef>
-            <a:fillRef idx="1">
-              <a:schemeClr val="accent1"/>
-            </a:fillRef>
-            <a:effectRef idx="0">
-              <a:schemeClr val="accent1"/>
-            </a:effectRef>
-            <a:fontRef idx="minor">
-              <a:schemeClr val="lt1"/>
-            </a:fontRef>
-          </p:style>
-        </p:cxnSp>
-        <p:cxnSp>
-          <p:nvCxnSpPr>
-            <p:cNvPr id="32" name="Conector recto de flecha 3"/>
-            <p:cNvCxnSpPr/>
-            <p:nvPr/>
-          </p:nvCxnSpPr>
-          <p:spPr>
-            <a:xfrm flipH="1">
-              <a:off x="3416269" y="2630932"/>
-              <a:ext cx="199847" cy="590909"/>
-            </a:xfrm>
-            <a:prstGeom prst="straightConnector1">
-              <a:avLst/>
-            </a:prstGeom>
-            <a:ln>
-              <a:solidFill>
-                <a:schemeClr val="tx2">
-                  <a:lumMod val="75000"/>
-                </a:schemeClr>
-              </a:solidFill>
-              <a:headEnd type="none"/>
-              <a:tailEnd type="none"/>
-            </a:ln>
-          </p:spPr>
-          <p:style>
-            <a:lnRef idx="2">
-              <a:schemeClr val="accent1">
-                <a:shade val="50000"/>
-              </a:schemeClr>
-            </a:lnRef>
-            <a:fillRef idx="1">
-              <a:schemeClr val="accent1"/>
-            </a:fillRef>
-            <a:effectRef idx="0">
-              <a:schemeClr val="accent1"/>
-            </a:effectRef>
-            <a:fontRef idx="minor">
-              <a:schemeClr val="lt1"/>
-            </a:fontRef>
-          </p:style>
-        </p:cxnSp>
-        <p:cxnSp>
-          <p:nvCxnSpPr>
-            <p:cNvPr id="33" name="Conector curvado 5"/>
-            <p:cNvCxnSpPr/>
-            <p:nvPr/>
-          </p:nvCxnSpPr>
-          <p:spPr>
-            <a:xfrm>
-              <a:off x="3201838" y="2792079"/>
-              <a:ext cx="303362" cy="188346"/>
-            </a:xfrm>
-            <a:prstGeom prst="curvedConnector3">
-              <a:avLst/>
-            </a:prstGeom>
-            <a:ln>
-              <a:solidFill>
-                <a:schemeClr val="bg2">
-                  <a:lumMod val="50000"/>
-                </a:schemeClr>
-              </a:solidFill>
-              <a:headEnd type="none"/>
-              <a:tailEnd type="none"/>
-            </a:ln>
-          </p:spPr>
-          <p:style>
-            <a:lnRef idx="2">
-              <a:schemeClr val="accent1">
-                <a:shade val="50000"/>
-              </a:schemeClr>
-            </a:lnRef>
-            <a:fillRef idx="1">
-              <a:schemeClr val="accent1"/>
-            </a:fillRef>
-            <a:effectRef idx="0">
-              <a:schemeClr val="accent1"/>
-            </a:effectRef>
-            <a:fontRef idx="minor">
-              <a:schemeClr val="lt1"/>
-            </a:fontRef>
-          </p:style>
-        </p:cxnSp>
-        <p:sp>
-          <p:nvSpPr>
-            <p:cNvPr id="34" name="Triángulo isósceles 6"/>
-            <p:cNvSpPr/>
-            <p:nvPr/>
-          </p:nvSpPr>
-          <p:spPr>
-            <a:xfrm rot="4680000">
-              <a:off x="3026434" y="2623866"/>
-              <a:ext cx="510759" cy="363950"/>
-            </a:xfrm>
-            <a:prstGeom prst="triangle">
-              <a:avLst/>
-            </a:prstGeom>
-            <a:solidFill>
-              <a:schemeClr val="bg1"/>
-            </a:solidFill>
-            <a:ln>
-              <a:solidFill>
-                <a:schemeClr val="bg1"/>
-              </a:solidFill>
-            </a:ln>
-          </p:spPr>
-          <p:style>
-            <a:lnRef idx="2">
-              <a:schemeClr val="accent1">
-                <a:shade val="50000"/>
-              </a:schemeClr>
-            </a:lnRef>
-            <a:fillRef idx="1">
-              <a:schemeClr val="accent1"/>
-            </a:fillRef>
-            <a:effectRef idx="0">
-              <a:schemeClr val="accent1"/>
-            </a:effectRef>
-            <a:fontRef idx="minor">
-              <a:schemeClr val="lt1"/>
-            </a:fontRef>
-          </p:style>
-          <p:txBody>
-            <a:bodyPr rtlCol="0" anchor="ctr"/>
-            <a:lstStyle/>
-            <a:p>
-              <a:pPr algn="ctr"/>
-              <a:endParaRPr lang="es-ES"/>
-            </a:p>
-          </p:txBody>
-        </p:sp>
-        <p:sp>
-          <p:nvSpPr>
-            <p:cNvPr id="35" name="Elipse 7"/>
-            <p:cNvSpPr/>
-            <p:nvPr/>
-          </p:nvSpPr>
-          <p:spPr>
-            <a:xfrm>
-              <a:off x="3427922" y="2871218"/>
-              <a:ext cx="67993" cy="69910"/>
-            </a:xfrm>
-            <a:prstGeom prst="ellipse">
-              <a:avLst/>
-            </a:prstGeom>
-            <a:solidFill>
-              <a:schemeClr val="bg2">
-                <a:lumMod val="25000"/>
-              </a:schemeClr>
-            </a:solidFill>
-            <a:ln>
-              <a:solidFill>
-                <a:schemeClr val="tx1"/>
-              </a:solidFill>
-            </a:ln>
-          </p:spPr>
-          <p:style>
-            <a:lnRef idx="2">
-              <a:schemeClr val="accent1">
-                <a:shade val="50000"/>
-              </a:schemeClr>
-            </a:lnRef>
-            <a:fillRef idx="1">
-              <a:schemeClr val="accent1"/>
-            </a:fillRef>
-            <a:effectRef idx="0">
-              <a:schemeClr val="accent1"/>
-            </a:effectRef>
-            <a:fontRef idx="minor">
-              <a:schemeClr val="lt1"/>
-            </a:fontRef>
-          </p:style>
-          <p:txBody>
-            <a:bodyPr rtlCol="0" anchor="ctr"/>
-            <a:lstStyle/>
-            <a:p>
-              <a:pPr algn="ctr"/>
-              <a:endParaRPr lang="es-ES"/>
-            </a:p>
-          </p:txBody>
-        </p:sp>
-        <p:cxnSp>
-          <p:nvCxnSpPr>
-            <p:cNvPr id="36" name="Conector recto de flecha 8"/>
-            <p:cNvCxnSpPr/>
-            <p:nvPr/>
-          </p:nvCxnSpPr>
-          <p:spPr>
-            <a:xfrm flipH="1">
-              <a:off x="3305897" y="3312353"/>
-              <a:ext cx="63261" cy="181156"/>
-            </a:xfrm>
-            <a:prstGeom prst="straightConnector1">
-              <a:avLst/>
-            </a:prstGeom>
-            <a:ln>
-              <a:solidFill>
-                <a:schemeClr val="tx1">
-                  <a:lumMod val="95000"/>
-                  <a:lumOff val="5000"/>
-                </a:schemeClr>
+                <a:srgbClr val="002060"/>
               </a:solidFill>
               <a:headEnd type="none"/>
               <a:tailEnd type="none"/>
@@ -4609,24 +4937,21 @@
         </p:cxnSp>
         <p:cxnSp>
           <p:nvCxnSpPr>
-            <p:cNvPr id="37" name="Conector recto de flecha 9"/>
+            <p:cNvPr id="49" name="Conector recto de flecha 9"/>
             <p:cNvCxnSpPr/>
             <p:nvPr/>
           </p:nvCxnSpPr>
           <p:spPr>
-            <a:xfrm flipH="1">
-              <a:off x="3220528" y="3572774"/>
-              <a:ext cx="63261" cy="181156"/>
+            <a:xfrm rot="2107705" flipH="1">
+              <a:off x="5785327" y="5444116"/>
+              <a:ext cx="92637" cy="273767"/>
             </a:xfrm>
             <a:prstGeom prst="straightConnector1">
               <a:avLst/>
             </a:prstGeom>
             <a:ln>
               <a:solidFill>
-                <a:schemeClr val="tx1">
-                  <a:lumMod val="95000"/>
-                  <a:lumOff val="5000"/>
-                </a:schemeClr>
+                <a:srgbClr val="002060"/>
               </a:solidFill>
               <a:headEnd type="none"/>
               <a:tailEnd type="none"/>
@@ -4649,24 +4974,21 @@
         </p:cxnSp>
         <p:cxnSp>
           <p:nvCxnSpPr>
-            <p:cNvPr id="38" name="Conector recto de flecha 10"/>
+            <p:cNvPr id="50" name="Conector recto de flecha 10"/>
             <p:cNvCxnSpPr/>
             <p:nvPr/>
           </p:nvCxnSpPr>
           <p:spPr>
-            <a:xfrm flipH="1">
-              <a:off x="3127075" y="3831566"/>
-              <a:ext cx="63261" cy="181156"/>
+            <a:xfrm rot="2107705" flipH="1">
+              <a:off x="5448365" y="5685232"/>
+              <a:ext cx="92637" cy="273767"/>
             </a:xfrm>
             <a:prstGeom prst="straightConnector1">
               <a:avLst/>
             </a:prstGeom>
             <a:ln>
               <a:solidFill>
-                <a:schemeClr val="tx1">
-                  <a:lumMod val="95000"/>
-                  <a:lumOff val="5000"/>
-                </a:schemeClr>
+                <a:srgbClr val="002060"/>
               </a:solidFill>
               <a:headEnd type="none"/>
               <a:tailEnd type="none"/>
@@ -4689,24 +5011,73 @@
         </p:cxnSp>
         <p:cxnSp>
           <p:nvCxnSpPr>
-            <p:cNvPr id="39" name="Conector recto de flecha 11"/>
+            <p:cNvPr id="51" name="Conector recto de flecha 8"/>
             <p:cNvCxnSpPr/>
             <p:nvPr/>
           </p:nvCxnSpPr>
           <p:spPr>
-            <a:xfrm flipH="1">
-              <a:off x="2976113" y="3184585"/>
-              <a:ext cx="120770" cy="123647"/>
+            <a:xfrm rot="2107705" flipH="1">
+              <a:off x="6428096" y="4947723"/>
+              <a:ext cx="92637" cy="273767"/>
             </a:xfrm>
             <a:prstGeom prst="straightConnector1">
               <a:avLst/>
             </a:prstGeom>
             <a:ln>
               <a:solidFill>
-                <a:schemeClr val="tx1">
-                  <a:lumMod val="95000"/>
-                  <a:lumOff val="5000"/>
-                </a:schemeClr>
+                <a:srgbClr val="002060"/>
+              </a:solidFill>
+              <a:headEnd type="none"/>
+              <a:tailEnd type="none"/>
+            </a:ln>
+          </p:spPr>
+          <p:style>
+            <a:lnRef idx="1">
+              <a:schemeClr val="accent5"/>
+            </a:lnRef>
+            <a:fillRef idx="0">
+              <a:schemeClr val="accent5"/>
+            </a:fillRef>
+            <a:effectRef idx="0">
+              <a:schemeClr val="accent5"/>
+            </a:effectRef>
+            <a:fontRef idx="minor">
+              <a:schemeClr val="tx1"/>
+            </a:fontRef>
+          </p:style>
+        </p:cxnSp>
+      </p:grpSp>
+      <p:grpSp>
+        <p:nvGrpSpPr>
+          <p:cNvPr id="52" name="Group 51"/>
+          <p:cNvGrpSpPr/>
+          <p:nvPr/>
+        </p:nvGrpSpPr>
+        <p:grpSpPr>
+          <a:xfrm rot="1727179">
+            <a:off x="3530027" y="3513948"/>
+            <a:ext cx="1072368" cy="1011276"/>
+            <a:chOff x="5448365" y="4947723"/>
+            <a:chExt cx="1072368" cy="1011276"/>
+          </a:xfrm>
+        </p:grpSpPr>
+        <p:cxnSp>
+          <p:nvCxnSpPr>
+            <p:cNvPr id="53" name="Conector recto de flecha 8"/>
+            <p:cNvCxnSpPr/>
+            <p:nvPr/>
+          </p:nvCxnSpPr>
+          <p:spPr>
+            <a:xfrm rot="2107705" flipH="1">
+              <a:off x="6114025" y="5194176"/>
+              <a:ext cx="92637" cy="273767"/>
+            </a:xfrm>
+            <a:prstGeom prst="straightConnector1">
+              <a:avLst/>
+            </a:prstGeom>
+            <a:ln>
+              <a:solidFill>
+                <a:srgbClr val="002060"/>
               </a:solidFill>
               <a:headEnd type="none"/>
               <a:tailEnd type="none"/>
@@ -4729,24 +5100,21 @@
         </p:cxnSp>
         <p:cxnSp>
           <p:nvCxnSpPr>
-            <p:cNvPr id="40" name="Conector recto de flecha 12"/>
+            <p:cNvPr id="54" name="Conector recto de flecha 9"/>
             <p:cNvCxnSpPr/>
             <p:nvPr/>
           </p:nvCxnSpPr>
           <p:spPr>
-            <a:xfrm flipH="1">
-              <a:off x="2789207" y="3378678"/>
-              <a:ext cx="120770" cy="123647"/>
+            <a:xfrm rot="2107705" flipH="1">
+              <a:off x="5785327" y="5444116"/>
+              <a:ext cx="92637" cy="273767"/>
             </a:xfrm>
             <a:prstGeom prst="straightConnector1">
               <a:avLst/>
             </a:prstGeom>
             <a:ln>
               <a:solidFill>
-                <a:schemeClr val="tx1">
-                  <a:lumMod val="95000"/>
-                  <a:lumOff val="5000"/>
-                </a:schemeClr>
+                <a:srgbClr val="002060"/>
               </a:solidFill>
               <a:headEnd type="none"/>
               <a:tailEnd type="none"/>
@@ -4769,24 +5137,21 @@
         </p:cxnSp>
         <p:cxnSp>
           <p:nvCxnSpPr>
-            <p:cNvPr id="41" name="Conector recto de flecha 13"/>
+            <p:cNvPr id="55" name="Conector recto de flecha 10"/>
             <p:cNvCxnSpPr/>
             <p:nvPr/>
           </p:nvCxnSpPr>
           <p:spPr>
-            <a:xfrm flipH="1">
-              <a:off x="2595112" y="3579961"/>
-              <a:ext cx="120770" cy="123647"/>
+            <a:xfrm rot="2107705" flipH="1">
+              <a:off x="5448365" y="5685232"/>
+              <a:ext cx="92637" cy="273767"/>
             </a:xfrm>
             <a:prstGeom prst="straightConnector1">
               <a:avLst/>
             </a:prstGeom>
             <a:ln>
               <a:solidFill>
-                <a:schemeClr val="tx1">
-                  <a:lumMod val="95000"/>
-                  <a:lumOff val="5000"/>
-                </a:schemeClr>
+                <a:srgbClr val="002060"/>
               </a:solidFill>
               <a:headEnd type="none"/>
               <a:tailEnd type="none"/>
@@ -4807,98 +5172,43 @@
             </a:fontRef>
           </p:style>
         </p:cxnSp>
-        <p:sp>
-          <p:nvSpPr>
-            <p:cNvPr id="42" name="TextBox 15"/>
-            <p:cNvSpPr txBox="1"/>
+        <p:cxnSp>
+          <p:nvCxnSpPr>
+            <p:cNvPr id="56" name="Conector recto de flecha 8"/>
+            <p:cNvCxnSpPr/>
             <p:nvPr/>
-          </p:nvSpPr>
+          </p:nvCxnSpPr>
           <p:spPr>
-            <a:xfrm rot="19492295">
-              <a:off x="2493048" y="3294278"/>
-              <a:ext cx="448242" cy="307777"/>
+            <a:xfrm rot="2107705" flipH="1">
+              <a:off x="6428096" y="4947723"/>
+              <a:ext cx="92637" cy="273767"/>
             </a:xfrm>
-            <a:prstGeom prst="rect">
+            <a:prstGeom prst="straightConnector1">
               <a:avLst/>
             </a:prstGeom>
-            <a:noFill/>
+            <a:ln>
+              <a:solidFill>
+                <a:srgbClr val="002060"/>
+              </a:solidFill>
+              <a:headEnd type="none"/>
+              <a:tailEnd type="none"/>
+            </a:ln>
           </p:spPr>
-          <p:txBody>
-            <a:bodyPr wrap="square" rtlCol="0" anchor="t">
-              <a:spAutoFit/>
-            </a:bodyPr>
-            <a:lstStyle/>
-            <a:p>
-              <a:r>
-                <a:rPr lang="el-GR" sz="1400" dirty="0">
-                  <a:solidFill>
-                    <a:srgbClr val="3F3F3F"/>
-                  </a:solidFill>
-                  <a:latin typeface="Arial" charset="0"/>
-                </a:rPr>
-                <a:t>θ</a:t>
-              </a:r>
-              <a:r>
-                <a:rPr lang="el-GR" sz="700" dirty="0">
-                  <a:solidFill>
-                    <a:srgbClr val="3F3F3F"/>
-                  </a:solidFill>
-                  <a:latin typeface="Arial" charset="0"/>
-                </a:rPr>
-                <a:t>min</a:t>
-              </a:r>
-              <a:endParaRPr lang="es-ES" sz="700" dirty="0">
-                <a:latin typeface="Arial"/>
-              </a:endParaRPr>
-            </a:p>
-          </p:txBody>
-        </p:sp>
-        <p:sp>
-          <p:nvSpPr>
-            <p:cNvPr id="43" name="TextBox 42"/>
-            <p:cNvSpPr txBox="1"/>
-            <p:nvPr/>
-          </p:nvSpPr>
-          <p:spPr>
-            <a:xfrm rot="19492295">
-              <a:off x="3227929" y="3649734"/>
-              <a:ext cx="494401" cy="307777"/>
-            </a:xfrm>
-            <a:prstGeom prst="rect">
-              <a:avLst/>
-            </a:prstGeom>
-            <a:noFill/>
-          </p:spPr>
-          <p:txBody>
-            <a:bodyPr wrap="square" rtlCol="0" anchor="t">
-              <a:spAutoFit/>
-            </a:bodyPr>
-            <a:lstStyle/>
-            <a:p>
-              <a:r>
-                <a:rPr lang="el-GR" sz="1400" dirty="0">
-                  <a:solidFill>
-                    <a:srgbClr val="3F3F3F"/>
-                  </a:solidFill>
-                  <a:latin typeface="Arial" charset="0"/>
-                </a:rPr>
-                <a:t>θ</a:t>
-              </a:r>
-              <a:r>
-                <a:rPr lang="el-GR" sz="700" dirty="0">
-                  <a:solidFill>
-                    <a:srgbClr val="3F3F3F"/>
-                  </a:solidFill>
-                  <a:latin typeface="Arial" charset="0"/>
-                </a:rPr>
-                <a:t>max</a:t>
-              </a:r>
-              <a:endParaRPr lang="es-ES" sz="700" dirty="0">
-                <a:latin typeface="Arial"/>
-              </a:endParaRPr>
-            </a:p>
-          </p:txBody>
-        </p:sp>
+          <p:style>
+            <a:lnRef idx="1">
+              <a:schemeClr val="accent5"/>
+            </a:lnRef>
+            <a:fillRef idx="0">
+              <a:schemeClr val="accent5"/>
+            </a:fillRef>
+            <a:effectRef idx="0">
+              <a:schemeClr val="accent5"/>
+            </a:effectRef>
+            <a:fontRef idx="minor">
+              <a:schemeClr val="tx1"/>
+            </a:fontRef>
+          </p:style>
+        </p:cxnSp>
       </p:grpSp>
     </p:spTree>
     <p:extLst>

</xml_diff>